<commit_message>
Add solution to a Day 2 problem
</commit_message>
<xml_diff>
--- a/Day_2/Day_2.pptx
+++ b/Day_2/Day_2.pptx
@@ -12412,14 +12412,19 @@
             <p:ph type="ctrTitle"/>
           </p:nvPr>
         </p:nvSpPr>
-        <p:spPr/>
+        <p:spPr>
+          <a:xfrm>
+            <a:off x="1910836" y="1225602"/>
+            <a:ext cx="8791575" cy="1978121"/>
+          </a:xfrm>
+        </p:spPr>
         <p:txBody>
           <a:bodyPr anchor="ctr"/>
           <a:lstStyle/>
           <a:p>
             <a:pPr algn="ctr"/>
             <a:r>
-              <a:rPr lang="en-US" dirty="0"/>
+              <a:rPr lang="en-US" b="1" dirty="0"/>
               <a:t>Conditionals</a:t>
             </a:r>
           </a:p>
@@ -12427,10 +12432,10 @@
       </p:sp>
       <p:sp>
         <p:nvSpPr>
-          <p:cNvPr id="3" name="Subtitle 2">
+          <p:cNvPr id="13" name="Subtitle 12">
             <a:extLst>
               <a:ext uri="{FF2B5EF4-FFF2-40B4-BE49-F238E27FC236}">
-                <a16:creationId xmlns:a16="http://schemas.microsoft.com/office/drawing/2014/main" id="{F9D1D2CE-B824-DE4C-B0BA-4E0B5113A1A1}"/>
+                <a16:creationId xmlns:a16="http://schemas.microsoft.com/office/drawing/2014/main" id="{EAE96A37-46D4-0F44-B369-0CB1FA877029}"/>
               </a:ext>
             </a:extLst>
           </p:cNvPr>
@@ -12441,7 +12446,12 @@
             <p:ph type="subTitle" idx="1"/>
           </p:nvPr>
         </p:nvSpPr>
-        <p:spPr/>
+        <p:spPr>
+          <a:xfrm>
+            <a:off x="1341334" y="3654278"/>
+            <a:ext cx="9509332" cy="2673402"/>
+          </a:xfrm>
+        </p:spPr>
         <p:txBody>
           <a:bodyPr>
             <a:normAutofit/>
@@ -12450,22 +12460,34 @@
           <a:p>
             <a:pPr algn="ctr"/>
             <a:r>
-              <a:rPr lang="en-US" dirty="0"/>
-              <a:t>By Philipp Tiso</a:t>
+              <a:rPr lang="en-US" sz="2800" dirty="0"/>
+              <a:t>By</a:t>
             </a:r>
           </a:p>
           <a:p>
             <a:pPr algn="ctr"/>
             <a:r>
-              <a:rPr lang="en-US" dirty="0"/>
+              <a:rPr lang="en-US" sz="2800" dirty="0"/>
+              <a:t>Philipp </a:t>
+            </a:r>
+            <a:r>
+              <a:rPr lang="en-US" sz="2800" dirty="0" err="1"/>
+              <a:t>tiso</a:t>
+            </a:r>
+            <a:endParaRPr lang="en-US" sz="2800" dirty="0"/>
+          </a:p>
+          <a:p>
+            <a:pPr algn="ctr"/>
+            <a:r>
+              <a:rPr lang="en-US" sz="2800" dirty="0"/>
               <a:t>&amp;</a:t>
             </a:r>
           </a:p>
           <a:p>
             <a:pPr algn="ctr"/>
             <a:r>
-              <a:rPr lang="en-US" dirty="0"/>
-              <a:t>Alexander Jaeger</a:t>
+              <a:rPr lang="en-US" sz="2800" dirty="0"/>
+              <a:t>Alexander jaeger</a:t>
             </a:r>
           </a:p>
         </p:txBody>
@@ -27012,7 +27034,9 @@
         </p:nvSpPr>
         <p:spPr/>
         <p:txBody>
-          <a:bodyPr/>
+          <a:bodyPr>
+            <a:normAutofit lnSpcReduction="10000"/>
+          </a:bodyPr>
           <a:lstStyle/>
           <a:p>
             <a:r>
@@ -27021,6 +27045,13 @@
             </a:r>
           </a:p>
           <a:p>
+            <a:pPr lvl="1"/>
+            <a:r>
+              <a:rPr lang="en-US" dirty="0"/>
+              <a:t>Almost everything we do in our daily lives is conditional!</a:t>
+            </a:r>
+          </a:p>
+          <a:p>
             <a:endParaRPr lang="en-US" dirty="0"/>
           </a:p>
           <a:p>
@@ -27038,7 +27069,7 @@
           <a:p>
             <a:r>
               <a:rPr lang="en-US" dirty="0"/>
-              <a:t>Lets look at some examples</a:t>
+              <a:t>Lets look at some examples!</a:t>
             </a:r>
           </a:p>
         </p:txBody>
@@ -27158,33 +27189,15 @@
                                   </p:childTnLst>
                                 </p:cTn>
                               </p:par>
-                            </p:childTnLst>
-                          </p:cTn>
-                        </p:par>
-                      </p:childTnLst>
-                    </p:cTn>
-                  </p:par>
-                  <p:par>
-                    <p:cTn id="9" fill="hold">
-                      <p:stCondLst>
-                        <p:cond delay="indefinite"/>
-                      </p:stCondLst>
-                      <p:childTnLst>
-                        <p:par>
-                          <p:cTn id="10" fill="hold">
-                            <p:stCondLst>
-                              <p:cond delay="0"/>
-                            </p:stCondLst>
-                            <p:childTnLst>
                               <p:par>
-                                <p:cTn id="11" presetID="2" presetClass="entr" presetSubtype="4" fill="hold" grpId="0" nodeType="clickEffect">
+                                <p:cTn id="9" presetID="2" presetClass="entr" presetSubtype="4" fill="hold" grpId="0" nodeType="withEffect">
                                   <p:stCondLst>
                                     <p:cond delay="0"/>
                                   </p:stCondLst>
                                   <p:childTnLst>
                                     <p:set>
                                       <p:cBhvr>
-                                        <p:cTn id="12" dur="1" fill="hold">
+                                        <p:cTn id="10" dur="1" fill="hold">
                                           <p:stCondLst>
                                             <p:cond delay="0"/>
                                           </p:stCondLst>
@@ -27192,7 +27205,7 @@
                                         <p:tgtEl>
                                           <p:spTgt spid="3">
                                             <p:txEl>
-                                              <p:pRg st="2" end="2"/>
+                                              <p:pRg st="1" end="1"/>
                                             </p:txEl>
                                           </p:spTgt>
                                         </p:tgtEl>
@@ -27206,11 +27219,11 @@
                                     </p:set>
                                     <p:anim calcmode="lin" valueType="num">
                                       <p:cBhvr additive="base">
-                                        <p:cTn id="13" dur="500" fill="hold"/>
+                                        <p:cTn id="11" dur="500" fill="hold"/>
                                         <p:tgtEl>
                                           <p:spTgt spid="3">
                                             <p:txEl>
-                                              <p:pRg st="2" end="2"/>
+                                              <p:pRg st="1" end="1"/>
                                             </p:txEl>
                                           </p:spTgt>
                                         </p:tgtEl>
@@ -27233,11 +27246,11 @@
                                     </p:anim>
                                     <p:anim calcmode="lin" valueType="num">
                                       <p:cBhvr additive="base">
-                                        <p:cTn id="14" dur="500" fill="hold"/>
+                                        <p:cTn id="12" dur="500" fill="hold"/>
                                         <p:tgtEl>
                                           <p:spTgt spid="3">
                                             <p:txEl>
-                                              <p:pRg st="2" end="2"/>
+                                              <p:pRg st="1" end="1"/>
                                             </p:txEl>
                                           </p:spTgt>
                                         </p:tgtEl>
@@ -27268,26 +27281,26 @@
                     </p:cTn>
                   </p:par>
                   <p:par>
-                    <p:cTn id="15" fill="hold">
+                    <p:cTn id="13" fill="hold">
                       <p:stCondLst>
                         <p:cond delay="indefinite"/>
                       </p:stCondLst>
                       <p:childTnLst>
                         <p:par>
-                          <p:cTn id="16" fill="hold">
+                          <p:cTn id="14" fill="hold">
                             <p:stCondLst>
                               <p:cond delay="0"/>
                             </p:stCondLst>
                             <p:childTnLst>
                               <p:par>
-                                <p:cTn id="17" presetID="2" presetClass="entr" presetSubtype="4" fill="hold" grpId="0" nodeType="clickEffect">
+                                <p:cTn id="15" presetID="2" presetClass="entr" presetSubtype="4" fill="hold" grpId="0" nodeType="clickEffect">
                                   <p:stCondLst>
                                     <p:cond delay="0"/>
                                   </p:stCondLst>
                                   <p:childTnLst>
                                     <p:set>
                                       <p:cBhvr>
-                                        <p:cTn id="18" dur="1" fill="hold">
+                                        <p:cTn id="16" dur="1" fill="hold">
                                           <p:stCondLst>
                                             <p:cond delay="0"/>
                                           </p:stCondLst>
@@ -27295,7 +27308,7 @@
                                         <p:tgtEl>
                                           <p:spTgt spid="3">
                                             <p:txEl>
-                                              <p:pRg st="5" end="5"/>
+                                              <p:pRg st="3" end="3"/>
                                             </p:txEl>
                                           </p:spTgt>
                                         </p:tgtEl>
@@ -27309,11 +27322,11 @@
                                     </p:set>
                                     <p:anim calcmode="lin" valueType="num">
                                       <p:cBhvr additive="base">
-                                        <p:cTn id="19" dur="500" fill="hold"/>
+                                        <p:cTn id="17" dur="500" fill="hold"/>
                                         <p:tgtEl>
                                           <p:spTgt spid="3">
                                             <p:txEl>
-                                              <p:pRg st="5" end="5"/>
+                                              <p:pRg st="3" end="3"/>
                                             </p:txEl>
                                           </p:spTgt>
                                         </p:tgtEl>
@@ -27336,11 +27349,114 @@
                                     </p:anim>
                                     <p:anim calcmode="lin" valueType="num">
                                       <p:cBhvr additive="base">
-                                        <p:cTn id="20" dur="500" fill="hold"/>
+                                        <p:cTn id="18" dur="500" fill="hold"/>
                                         <p:tgtEl>
                                           <p:spTgt spid="3">
                                             <p:txEl>
-                                              <p:pRg st="5" end="5"/>
+                                              <p:pRg st="3" end="3"/>
+                                            </p:txEl>
+                                          </p:spTgt>
+                                        </p:tgtEl>
+                                        <p:attrNameLst>
+                                          <p:attrName>ppt_y</p:attrName>
+                                        </p:attrNameLst>
+                                      </p:cBhvr>
+                                      <p:tavLst>
+                                        <p:tav tm="0">
+                                          <p:val>
+                                            <p:strVal val="1+#ppt_h/2"/>
+                                          </p:val>
+                                        </p:tav>
+                                        <p:tav tm="100000">
+                                          <p:val>
+                                            <p:strVal val="#ppt_y"/>
+                                          </p:val>
+                                        </p:tav>
+                                      </p:tavLst>
+                                    </p:anim>
+                                  </p:childTnLst>
+                                </p:cTn>
+                              </p:par>
+                            </p:childTnLst>
+                          </p:cTn>
+                        </p:par>
+                      </p:childTnLst>
+                    </p:cTn>
+                  </p:par>
+                  <p:par>
+                    <p:cTn id="19" fill="hold">
+                      <p:stCondLst>
+                        <p:cond delay="indefinite"/>
+                      </p:stCondLst>
+                      <p:childTnLst>
+                        <p:par>
+                          <p:cTn id="20" fill="hold">
+                            <p:stCondLst>
+                              <p:cond delay="0"/>
+                            </p:stCondLst>
+                            <p:childTnLst>
+                              <p:par>
+                                <p:cTn id="21" presetID="2" presetClass="entr" presetSubtype="4" fill="hold" grpId="0" nodeType="clickEffect">
+                                  <p:stCondLst>
+                                    <p:cond delay="0"/>
+                                  </p:stCondLst>
+                                  <p:childTnLst>
+                                    <p:set>
+                                      <p:cBhvr>
+                                        <p:cTn id="22" dur="1" fill="hold">
+                                          <p:stCondLst>
+                                            <p:cond delay="0"/>
+                                          </p:stCondLst>
+                                        </p:cTn>
+                                        <p:tgtEl>
+                                          <p:spTgt spid="3">
+                                            <p:txEl>
+                                              <p:pRg st="6" end="6"/>
+                                            </p:txEl>
+                                          </p:spTgt>
+                                        </p:tgtEl>
+                                        <p:attrNameLst>
+                                          <p:attrName>style.visibility</p:attrName>
+                                        </p:attrNameLst>
+                                      </p:cBhvr>
+                                      <p:to>
+                                        <p:strVal val="visible"/>
+                                      </p:to>
+                                    </p:set>
+                                    <p:anim calcmode="lin" valueType="num">
+                                      <p:cBhvr additive="base">
+                                        <p:cTn id="23" dur="500" fill="hold"/>
+                                        <p:tgtEl>
+                                          <p:spTgt spid="3">
+                                            <p:txEl>
+                                              <p:pRg st="6" end="6"/>
+                                            </p:txEl>
+                                          </p:spTgt>
+                                        </p:tgtEl>
+                                        <p:attrNameLst>
+                                          <p:attrName>ppt_x</p:attrName>
+                                        </p:attrNameLst>
+                                      </p:cBhvr>
+                                      <p:tavLst>
+                                        <p:tav tm="0">
+                                          <p:val>
+                                            <p:strVal val="#ppt_x"/>
+                                          </p:val>
+                                        </p:tav>
+                                        <p:tav tm="100000">
+                                          <p:val>
+                                            <p:strVal val="#ppt_x"/>
+                                          </p:val>
+                                        </p:tav>
+                                      </p:tavLst>
+                                    </p:anim>
+                                    <p:anim calcmode="lin" valueType="num">
+                                      <p:cBhvr additive="base">
+                                        <p:cTn id="24" dur="500" fill="hold"/>
+                                        <p:tgtEl>
+                                          <p:spTgt spid="3">
+                                            <p:txEl>
+                                              <p:pRg st="6" end="6"/>
                                             </p:txEl>
                                           </p:spTgt>
                                         </p:tgtEl>
@@ -37910,23 +38026,18 @@
           <a:p>
             <a:r>
               <a:rPr lang="en-US" dirty="0"/>
-              <a:t>If you finish early then we can take a deeper look into how the CPU and Memory actually works (or anything that you would like to know </a:t>
-            </a:r>
-            <a:r>
-              <a:rPr lang="en-US"/>
-              <a:t>more about </a:t>
-            </a:r>
-            <a:r>
-              <a:rPr lang="en-US">
+              <a:t>If you finish early then we can take a deeper look into how the CPU and Memory actually works (or anything that you would like to know more about </a:t>
+            </a:r>
+            <a:r>
+              <a:rPr lang="en-US" dirty="0">
                 <a:sym typeface="Wingdings" pitchFamily="2" charset="2"/>
               </a:rPr>
               <a:t></a:t>
             </a:r>
             <a:r>
-              <a:rPr lang="en-US"/>
+              <a:rPr lang="en-US" dirty="0"/>
               <a:t>). </a:t>
             </a:r>
-            <a:endParaRPr lang="en-US" dirty="0"/>
           </a:p>
         </p:txBody>
       </p:sp>

</xml_diff>